<commit_message>
added homework 4 files
</commit_message>
<xml_diff>
--- a/HW3_Sudhanshu_Kakkar.pptx
+++ b/HW3_Sudhanshu_Kakkar.pptx
@@ -111,6 +111,11 @@
       </a:defRPr>
     </a:lvl9pPr>
   </p:defaultTextStyle>
+  <p:extLst>
+    <p:ext uri="{EFAFB233-063F-42B5-8137-9DF3F51BA10A}">
+      <p15:sldGuideLst xmlns:p15="http://schemas.microsoft.com/office/powerpoint/2012/main"/>
+    </p:ext>
+  </p:extLst>
 </p:presentation>
 </file>
 
@@ -196,7 +201,7 @@
           <a:p>
             <a:fld id="{2CF15C6B-76EC-4142-A940-DBD59C818865}" type="datetimeFigureOut">
               <a:rPr lang="en-IN" smtClean="0"/>
-              <a:t>22-09-2025</a:t>
+              <a:t>29-09-2025</a:t>
             </a:fld>
             <a:endParaRPr lang="en-IN"/>
           </a:p>
@@ -1021,7 +1026,7 @@
           <a:p>
             <a:fld id="{969C4986-7DEB-4068-B691-7A99EC7B716C}" type="datetimeFigureOut">
               <a:rPr lang="en-IN" smtClean="0"/>
-              <a:t>22-09-2025</a:t>
+              <a:t>29-09-2025</a:t>
             </a:fld>
             <a:endParaRPr lang="en-IN"/>
           </a:p>
@@ -1221,7 +1226,7 @@
           <a:p>
             <a:fld id="{969C4986-7DEB-4068-B691-7A99EC7B716C}" type="datetimeFigureOut">
               <a:rPr lang="en-IN" smtClean="0"/>
-              <a:t>22-09-2025</a:t>
+              <a:t>29-09-2025</a:t>
             </a:fld>
             <a:endParaRPr lang="en-IN"/>
           </a:p>
@@ -1431,7 +1436,7 @@
           <a:p>
             <a:fld id="{969C4986-7DEB-4068-B691-7A99EC7B716C}" type="datetimeFigureOut">
               <a:rPr lang="en-IN" smtClean="0"/>
-              <a:t>22-09-2025</a:t>
+              <a:t>29-09-2025</a:t>
             </a:fld>
             <a:endParaRPr lang="en-IN"/>
           </a:p>
@@ -1631,7 +1636,7 @@
           <a:p>
             <a:fld id="{969C4986-7DEB-4068-B691-7A99EC7B716C}" type="datetimeFigureOut">
               <a:rPr lang="en-IN" smtClean="0"/>
-              <a:t>22-09-2025</a:t>
+              <a:t>29-09-2025</a:t>
             </a:fld>
             <a:endParaRPr lang="en-IN"/>
           </a:p>
@@ -1907,7 +1912,7 @@
           <a:p>
             <a:fld id="{969C4986-7DEB-4068-B691-7A99EC7B716C}" type="datetimeFigureOut">
               <a:rPr lang="en-IN" smtClean="0"/>
-              <a:t>22-09-2025</a:t>
+              <a:t>29-09-2025</a:t>
             </a:fld>
             <a:endParaRPr lang="en-IN"/>
           </a:p>
@@ -2175,7 +2180,7 @@
           <a:p>
             <a:fld id="{969C4986-7DEB-4068-B691-7A99EC7B716C}" type="datetimeFigureOut">
               <a:rPr lang="en-IN" smtClean="0"/>
-              <a:t>22-09-2025</a:t>
+              <a:t>29-09-2025</a:t>
             </a:fld>
             <a:endParaRPr lang="en-IN"/>
           </a:p>
@@ -2590,7 +2595,7 @@
           <a:p>
             <a:fld id="{969C4986-7DEB-4068-B691-7A99EC7B716C}" type="datetimeFigureOut">
               <a:rPr lang="en-IN" smtClean="0"/>
-              <a:t>22-09-2025</a:t>
+              <a:t>29-09-2025</a:t>
             </a:fld>
             <a:endParaRPr lang="en-IN"/>
           </a:p>
@@ -2732,7 +2737,7 @@
           <a:p>
             <a:fld id="{969C4986-7DEB-4068-B691-7A99EC7B716C}" type="datetimeFigureOut">
               <a:rPr lang="en-IN" smtClean="0"/>
-              <a:t>22-09-2025</a:t>
+              <a:t>29-09-2025</a:t>
             </a:fld>
             <a:endParaRPr lang="en-IN"/>
           </a:p>
@@ -2845,7 +2850,7 @@
           <a:p>
             <a:fld id="{969C4986-7DEB-4068-B691-7A99EC7B716C}" type="datetimeFigureOut">
               <a:rPr lang="en-IN" smtClean="0"/>
-              <a:t>22-09-2025</a:t>
+              <a:t>29-09-2025</a:t>
             </a:fld>
             <a:endParaRPr lang="en-IN"/>
           </a:p>
@@ -3158,7 +3163,7 @@
           <a:p>
             <a:fld id="{969C4986-7DEB-4068-B691-7A99EC7B716C}" type="datetimeFigureOut">
               <a:rPr lang="en-IN" smtClean="0"/>
-              <a:t>22-09-2025</a:t>
+              <a:t>29-09-2025</a:t>
             </a:fld>
             <a:endParaRPr lang="en-IN"/>
           </a:p>
@@ -3447,7 +3452,7 @@
           <a:p>
             <a:fld id="{969C4986-7DEB-4068-B691-7A99EC7B716C}" type="datetimeFigureOut">
               <a:rPr lang="en-IN" smtClean="0"/>
-              <a:t>22-09-2025</a:t>
+              <a:t>29-09-2025</a:t>
             </a:fld>
             <a:endParaRPr lang="en-IN"/>
           </a:p>
@@ -3690,7 +3695,7 @@
           <a:p>
             <a:fld id="{969C4986-7DEB-4068-B691-7A99EC7B716C}" type="datetimeFigureOut">
               <a:rPr lang="en-IN" smtClean="0"/>
-              <a:t>22-09-2025</a:t>
+              <a:t>29-09-2025</a:t>
             </a:fld>
             <a:endParaRPr lang="en-IN"/>
           </a:p>

</xml_diff>